<commit_message>
Att apresentação e Classe
</commit_message>
<xml_diff>
--- a/Documentação/Arquivos/Apresentacao/OrganizZer.pptx
+++ b/Documentação/Arquivos/Apresentacao/OrganizZer.pptx
@@ -6,13 +6,16 @@
   </p:sldMasterIdLst>
   <p:sldIdLst>
     <p:sldId id="256" r:id="rId2"/>
-    <p:sldId id="261" r:id="rId3"/>
-    <p:sldId id="263" r:id="rId4"/>
-    <p:sldId id="262" r:id="rId5"/>
-    <p:sldId id="257" r:id="rId6"/>
-    <p:sldId id="258" r:id="rId7"/>
-    <p:sldId id="259" r:id="rId8"/>
-    <p:sldId id="260" r:id="rId9"/>
+    <p:sldId id="264" r:id="rId3"/>
+    <p:sldId id="265" r:id="rId4"/>
+    <p:sldId id="266" r:id="rId5"/>
+    <p:sldId id="261" r:id="rId6"/>
+    <p:sldId id="263" r:id="rId7"/>
+    <p:sldId id="262" r:id="rId8"/>
+    <p:sldId id="257" r:id="rId9"/>
+    <p:sldId id="258" r:id="rId10"/>
+    <p:sldId id="259" r:id="rId11"/>
+    <p:sldId id="260" r:id="rId12"/>
   </p:sldIdLst>
   <p:sldSz cx="12192000" cy="6858000"/>
   <p:notesSz cx="6858000" cy="9144000"/>
@@ -122,6 +125,14 @@
 <file path=ppt/slideLayouts/slideLayout1.xml><?xml version="1.0" encoding="utf-8"?>
 <p:sldLayout xmlns:a="http://schemas.openxmlformats.org/drawingml/2006/main" xmlns:r="http://schemas.openxmlformats.org/officeDocument/2006/relationships" xmlns:p="http://schemas.openxmlformats.org/presentationml/2006/main" type="title" preserve="1">
   <p:cSld name="Slide de título">
+    <p:bg>
+      <p:bgPr>
+        <a:solidFill>
+          <a:schemeClr val="bg1"/>
+        </a:solidFill>
+        <a:effectLst/>
+      </p:bgPr>
+    </p:bg>
     <p:spTree>
       <p:nvGrpSpPr>
         <p:cNvPr id="1" name=""/>
@@ -314,6 +325,14 @@
 <file path=ppt/slideLayouts/slideLayout10.xml><?xml version="1.0" encoding="utf-8"?>
 <p:sldLayout xmlns:a="http://schemas.openxmlformats.org/drawingml/2006/main" xmlns:r="http://schemas.openxmlformats.org/officeDocument/2006/relationships" xmlns:p="http://schemas.openxmlformats.org/presentationml/2006/main" type="vertTx" preserve="1">
   <p:cSld name="Título e texto vertical">
+    <p:bg>
+      <p:bgPr>
+        <a:solidFill>
+          <a:schemeClr val="bg1"/>
+        </a:solidFill>
+        <a:effectLst/>
+      </p:bgPr>
+    </p:bg>
     <p:spTree>
       <p:nvGrpSpPr>
         <p:cNvPr id="1" name=""/>
@@ -484,6 +503,14 @@
 <file path=ppt/slideLayouts/slideLayout11.xml><?xml version="1.0" encoding="utf-8"?>
 <p:sldLayout xmlns:a="http://schemas.openxmlformats.org/drawingml/2006/main" xmlns:r="http://schemas.openxmlformats.org/officeDocument/2006/relationships" xmlns:p="http://schemas.openxmlformats.org/presentationml/2006/main" type="vertTitleAndTx" preserve="1">
   <p:cSld name="Título e texto verticais">
+    <p:bg>
+      <p:bgPr>
+        <a:solidFill>
+          <a:schemeClr val="bg1"/>
+        </a:solidFill>
+        <a:effectLst/>
+      </p:bgPr>
+    </p:bg>
     <p:spTree>
       <p:nvGrpSpPr>
         <p:cNvPr id="1" name=""/>
@@ -664,6 +691,14 @@
 <file path=ppt/slideLayouts/slideLayout2.xml><?xml version="1.0" encoding="utf-8"?>
 <p:sldLayout xmlns:a="http://schemas.openxmlformats.org/drawingml/2006/main" xmlns:r="http://schemas.openxmlformats.org/officeDocument/2006/relationships" xmlns:p="http://schemas.openxmlformats.org/presentationml/2006/main" type="obj" preserve="1">
   <p:cSld name="Título e conteúdo">
+    <p:bg>
+      <p:bgPr>
+        <a:solidFill>
+          <a:schemeClr val="bg1"/>
+        </a:solidFill>
+        <a:effectLst/>
+      </p:bgPr>
+    </p:bg>
     <p:spTree>
       <p:nvGrpSpPr>
         <p:cNvPr id="1" name=""/>
@@ -834,6 +869,14 @@
 <file path=ppt/slideLayouts/slideLayout3.xml><?xml version="1.0" encoding="utf-8"?>
 <p:sldLayout xmlns:a="http://schemas.openxmlformats.org/drawingml/2006/main" xmlns:r="http://schemas.openxmlformats.org/officeDocument/2006/relationships" xmlns:p="http://schemas.openxmlformats.org/presentationml/2006/main" type="secHead" preserve="1">
   <p:cSld name="Cabeçalho da Seção">
+    <p:bg>
+      <p:bgPr>
+        <a:solidFill>
+          <a:schemeClr val="bg1"/>
+        </a:solidFill>
+        <a:effectLst/>
+      </p:bgPr>
+    </p:bg>
     <p:spTree>
       <p:nvGrpSpPr>
         <p:cNvPr id="1" name=""/>
@@ -1080,6 +1123,14 @@
 <file path=ppt/slideLayouts/slideLayout4.xml><?xml version="1.0" encoding="utf-8"?>
 <p:sldLayout xmlns:a="http://schemas.openxmlformats.org/drawingml/2006/main" xmlns:r="http://schemas.openxmlformats.org/officeDocument/2006/relationships" xmlns:p="http://schemas.openxmlformats.org/presentationml/2006/main" type="twoObj" preserve="1">
   <p:cSld name="Duas Partes de Conteúdo">
+    <p:bg>
+      <p:bgPr>
+        <a:solidFill>
+          <a:schemeClr val="bg1"/>
+        </a:solidFill>
+        <a:effectLst/>
+      </p:bgPr>
+    </p:bg>
     <p:spTree>
       <p:nvGrpSpPr>
         <p:cNvPr id="1" name=""/>
@@ -1312,6 +1363,14 @@
 <file path=ppt/slideLayouts/slideLayout5.xml><?xml version="1.0" encoding="utf-8"?>
 <p:sldLayout xmlns:a="http://schemas.openxmlformats.org/drawingml/2006/main" xmlns:r="http://schemas.openxmlformats.org/officeDocument/2006/relationships" xmlns:p="http://schemas.openxmlformats.org/presentationml/2006/main" type="twoTxTwoObj" preserve="1">
   <p:cSld name="Comparação">
+    <p:bg>
+      <p:bgPr>
+        <a:solidFill>
+          <a:schemeClr val="bg1"/>
+        </a:solidFill>
+        <a:effectLst/>
+      </p:bgPr>
+    </p:bg>
     <p:spTree>
       <p:nvGrpSpPr>
         <p:cNvPr id="1" name=""/>
@@ -1679,6 +1738,14 @@
 <file path=ppt/slideLayouts/slideLayout6.xml><?xml version="1.0" encoding="utf-8"?>
 <p:sldLayout xmlns:a="http://schemas.openxmlformats.org/drawingml/2006/main" xmlns:r="http://schemas.openxmlformats.org/officeDocument/2006/relationships" xmlns:p="http://schemas.openxmlformats.org/presentationml/2006/main" type="titleOnly" preserve="1">
   <p:cSld name="Somente título">
+    <p:bg>
+      <p:bgPr>
+        <a:solidFill>
+          <a:schemeClr val="bg1"/>
+        </a:solidFill>
+        <a:effectLst/>
+      </p:bgPr>
+    </p:bg>
     <p:spTree>
       <p:nvGrpSpPr>
         <p:cNvPr id="1" name=""/>
@@ -1797,6 +1864,14 @@
 <file path=ppt/slideLayouts/slideLayout7.xml><?xml version="1.0" encoding="utf-8"?>
 <p:sldLayout xmlns:a="http://schemas.openxmlformats.org/drawingml/2006/main" xmlns:r="http://schemas.openxmlformats.org/officeDocument/2006/relationships" xmlns:p="http://schemas.openxmlformats.org/presentationml/2006/main" type="blank" preserve="1">
   <p:cSld name="Em branco">
+    <p:bg>
+      <p:bgPr>
+        <a:solidFill>
+          <a:schemeClr val="bg1"/>
+        </a:solidFill>
+        <a:effectLst/>
+      </p:bgPr>
+    </p:bg>
     <p:spTree>
       <p:nvGrpSpPr>
         <p:cNvPr id="1" name=""/>
@@ -1892,6 +1967,14 @@
 <file path=ppt/slideLayouts/slideLayout8.xml><?xml version="1.0" encoding="utf-8"?>
 <p:sldLayout xmlns:a="http://schemas.openxmlformats.org/drawingml/2006/main" xmlns:r="http://schemas.openxmlformats.org/officeDocument/2006/relationships" xmlns:p="http://schemas.openxmlformats.org/presentationml/2006/main" type="objTx" preserve="1">
   <p:cSld name="Conteúdo com Legenda">
+    <p:bg>
+      <p:bgPr>
+        <a:solidFill>
+          <a:schemeClr val="bg1"/>
+        </a:solidFill>
+        <a:effectLst/>
+      </p:bgPr>
+    </p:bg>
     <p:spTree>
       <p:nvGrpSpPr>
         <p:cNvPr id="1" name=""/>
@@ -2169,6 +2252,14 @@
 <file path=ppt/slideLayouts/slideLayout9.xml><?xml version="1.0" encoding="utf-8"?>
 <p:sldLayout xmlns:a="http://schemas.openxmlformats.org/drawingml/2006/main" xmlns:r="http://schemas.openxmlformats.org/officeDocument/2006/relationships" xmlns:p="http://schemas.openxmlformats.org/presentationml/2006/main" type="picTx" preserve="1">
   <p:cSld name="Imagem com Legenda">
+    <p:bg>
+      <p:bgPr>
+        <a:solidFill>
+          <a:schemeClr val="bg1"/>
+        </a:solidFill>
+        <a:effectLst/>
+      </p:bgPr>
+    </p:bg>
     <p:spTree>
       <p:nvGrpSpPr>
         <p:cNvPr id="1" name=""/>
@@ -2423,9 +2514,12 @@
 <p:sldMaster xmlns:a="http://schemas.openxmlformats.org/drawingml/2006/main" xmlns:r="http://schemas.openxmlformats.org/officeDocument/2006/relationships" xmlns:p="http://schemas.openxmlformats.org/presentationml/2006/main">
   <p:cSld>
     <p:bg>
-      <p:bgRef idx="1001">
-        <a:schemeClr val="bg1"/>
-      </p:bgRef>
+      <p:bgPr>
+        <a:solidFill>
+          <a:schemeClr val="bg1"/>
+        </a:solidFill>
+        <a:effectLst/>
+      </p:bgPr>
     </p:bg>
     <p:spTree>
       <p:nvGrpSpPr>
@@ -2962,6 +3056,14 @@
 <file path=ppt/slides/slide1.xml><?xml version="1.0" encoding="utf-8"?>
 <p:sld xmlns:a="http://schemas.openxmlformats.org/drawingml/2006/main" xmlns:r="http://schemas.openxmlformats.org/officeDocument/2006/relationships" xmlns:p="http://schemas.openxmlformats.org/presentationml/2006/main">
   <p:cSld>
+    <p:bg>
+      <p:bgPr>
+        <a:solidFill>
+          <a:schemeClr val="bg2"/>
+        </a:solidFill>
+        <a:effectLst/>
+      </p:bgPr>
+    </p:bg>
     <p:spTree>
       <p:nvGrpSpPr>
         <p:cNvPr id="1" name=""/>
@@ -3047,9 +3149,573 @@
 </p:sld>
 </file>
 
+<file path=ppt/slides/slide10.xml><?xml version="1.0" encoding="utf-8"?>
+<p:sld xmlns:a="http://schemas.openxmlformats.org/drawingml/2006/main" xmlns:r="http://schemas.openxmlformats.org/officeDocument/2006/relationships" xmlns:p="http://schemas.openxmlformats.org/presentationml/2006/main">
+  <p:cSld>
+    <p:bg>
+      <p:bgPr>
+        <a:solidFill>
+          <a:schemeClr val="bg2"/>
+        </a:solidFill>
+        <a:effectLst/>
+      </p:bgPr>
+    </p:bg>
+    <p:spTree>
+      <p:nvGrpSpPr>
+        <p:cNvPr id="1" name=""/>
+        <p:cNvGrpSpPr/>
+        <p:nvPr/>
+      </p:nvGrpSpPr>
+      <p:grpSpPr>
+        <a:xfrm>
+          <a:off x="0" y="0"/>
+          <a:ext cx="0" cy="0"/>
+          <a:chOff x="0" y="0"/>
+          <a:chExt cx="0" cy="0"/>
+        </a:xfrm>
+      </p:grpSpPr>
+      <p:sp>
+        <p:nvSpPr>
+          <p:cNvPr id="2" name="Título 1">
+            <a:extLst>
+              <a:ext uri="{FF2B5EF4-FFF2-40B4-BE49-F238E27FC236}">
+                <a16:creationId xmlns:a16="http://schemas.microsoft.com/office/drawing/2014/main" id="{B1832E8B-AADD-4CF8-AEEE-5E79DEEA600E}"/>
+              </a:ext>
+            </a:extLst>
+          </p:cNvPr>
+          <p:cNvSpPr>
+            <a:spLocks noGrp="1"/>
+          </p:cNvSpPr>
+          <p:nvPr>
+            <p:ph type="title"/>
+          </p:nvPr>
+        </p:nvSpPr>
+        <p:spPr/>
+        <p:txBody>
+          <a:bodyPr/>
+          <a:lstStyle/>
+          <a:p>
+            <a:r>
+              <a:rPr lang="pt-BR" dirty="0">
+                <a:cs typeface="Calibri Light"/>
+              </a:rPr>
+              <a:t>Tela de Tarefa</a:t>
+            </a:r>
+            <a:endParaRPr lang="pt-BR" dirty="0"/>
+          </a:p>
+        </p:txBody>
+      </p:sp>
+      <p:pic>
+        <p:nvPicPr>
+          <p:cNvPr id="4" name="Imagem 4" descr="Uma imagem contendo captura de tela&#10;&#10;Descrição gerada com muito alta confiança">
+            <a:extLst>
+              <a:ext uri="{FF2B5EF4-FFF2-40B4-BE49-F238E27FC236}">
+                <a16:creationId xmlns:a16="http://schemas.microsoft.com/office/drawing/2014/main" id="{B38A0FC7-794A-4424-8CC4-DEBEB0C95C24}"/>
+              </a:ext>
+            </a:extLst>
+          </p:cNvPr>
+          <p:cNvPicPr>
+            <a:picLocks noGrp="1" noChangeAspect="1"/>
+          </p:cNvPicPr>
+          <p:nvPr>
+            <p:ph idx="1"/>
+          </p:nvPr>
+        </p:nvPicPr>
+        <p:blipFill>
+          <a:blip r:embed="rId2"/>
+          <a:stretch>
+            <a:fillRect/>
+          </a:stretch>
+        </p:blipFill>
+        <p:spPr>
+          <a:xfrm>
+            <a:off x="4879741" y="1825625"/>
+            <a:ext cx="2432519" cy="4351338"/>
+          </a:xfrm>
+          <a:prstGeom prst="rect">
+            <a:avLst/>
+          </a:prstGeom>
+        </p:spPr>
+      </p:pic>
+    </p:spTree>
+    <p:extLst>
+      <p:ext uri="{BB962C8B-B14F-4D97-AF65-F5344CB8AC3E}">
+        <p14:creationId xmlns:p14="http://schemas.microsoft.com/office/powerpoint/2010/main" val="223440725"/>
+      </p:ext>
+    </p:extLst>
+  </p:cSld>
+  <p:clrMapOvr>
+    <a:masterClrMapping/>
+  </p:clrMapOvr>
+</p:sld>
+</file>
+
+<file path=ppt/slides/slide11.xml><?xml version="1.0" encoding="utf-8"?>
+<p:sld xmlns:a="http://schemas.openxmlformats.org/drawingml/2006/main" xmlns:r="http://schemas.openxmlformats.org/officeDocument/2006/relationships" xmlns:p="http://schemas.openxmlformats.org/presentationml/2006/main">
+  <p:cSld>
+    <p:bg>
+      <p:bgPr>
+        <a:solidFill>
+          <a:schemeClr val="bg2"/>
+        </a:solidFill>
+        <a:effectLst/>
+      </p:bgPr>
+    </p:bg>
+    <p:spTree>
+      <p:nvGrpSpPr>
+        <p:cNvPr id="1" name=""/>
+        <p:cNvGrpSpPr/>
+        <p:nvPr/>
+      </p:nvGrpSpPr>
+      <p:grpSpPr>
+        <a:xfrm>
+          <a:off x="0" y="0"/>
+          <a:ext cx="0" cy="0"/>
+          <a:chOff x="0" y="0"/>
+          <a:chExt cx="0" cy="0"/>
+        </a:xfrm>
+      </p:grpSpPr>
+      <p:sp>
+        <p:nvSpPr>
+          <p:cNvPr id="2" name="Título 1">
+            <a:extLst>
+              <a:ext uri="{FF2B5EF4-FFF2-40B4-BE49-F238E27FC236}">
+                <a16:creationId xmlns:a16="http://schemas.microsoft.com/office/drawing/2014/main" id="{FC4BE301-2206-43AF-8358-86206A597EFD}"/>
+              </a:ext>
+            </a:extLst>
+          </p:cNvPr>
+          <p:cNvSpPr>
+            <a:spLocks noGrp="1"/>
+          </p:cNvSpPr>
+          <p:nvPr>
+            <p:ph type="title"/>
+          </p:nvPr>
+        </p:nvSpPr>
+        <p:spPr/>
+        <p:txBody>
+          <a:bodyPr/>
+          <a:lstStyle/>
+          <a:p>
+            <a:r>
+              <a:rPr lang="pt-BR">
+                <a:cs typeface="Calibri Light"/>
+              </a:rPr>
+              <a:t>Tela de Cadastro de Nova Tarefa</a:t>
+            </a:r>
+          </a:p>
+        </p:txBody>
+      </p:sp>
+      <p:pic>
+        <p:nvPicPr>
+          <p:cNvPr id="4" name="Imagem 4" descr="Uma imagem contendo captura de tela&#10;&#10;Descrição gerada com muito alta confiança">
+            <a:extLst>
+              <a:ext uri="{FF2B5EF4-FFF2-40B4-BE49-F238E27FC236}">
+                <a16:creationId xmlns:a16="http://schemas.microsoft.com/office/drawing/2014/main" id="{91B77452-B5E6-45FD-AFF4-7198F7340D5A}"/>
+              </a:ext>
+            </a:extLst>
+          </p:cNvPr>
+          <p:cNvPicPr>
+            <a:picLocks noGrp="1" noChangeAspect="1"/>
+          </p:cNvPicPr>
+          <p:nvPr>
+            <p:ph idx="1"/>
+          </p:nvPr>
+        </p:nvPicPr>
+        <p:blipFill>
+          <a:blip r:embed="rId2"/>
+          <a:stretch>
+            <a:fillRect/>
+          </a:stretch>
+        </p:blipFill>
+        <p:spPr>
+          <a:xfrm>
+            <a:off x="4875503" y="1825625"/>
+            <a:ext cx="2440994" cy="4351338"/>
+          </a:xfrm>
+          <a:prstGeom prst="rect">
+            <a:avLst/>
+          </a:prstGeom>
+        </p:spPr>
+      </p:pic>
+    </p:spTree>
+    <p:extLst>
+      <p:ext uri="{BB962C8B-B14F-4D97-AF65-F5344CB8AC3E}">
+        <p14:creationId xmlns:p14="http://schemas.microsoft.com/office/powerpoint/2010/main" val="3230421827"/>
+      </p:ext>
+    </p:extLst>
+  </p:cSld>
+  <p:clrMapOvr>
+    <a:masterClrMapping/>
+  </p:clrMapOvr>
+</p:sld>
+</file>
+
 <file path=ppt/slides/slide2.xml><?xml version="1.0" encoding="utf-8"?>
 <p:sld xmlns:a="http://schemas.openxmlformats.org/drawingml/2006/main" xmlns:r="http://schemas.openxmlformats.org/officeDocument/2006/relationships" xmlns:p="http://schemas.openxmlformats.org/presentationml/2006/main">
   <p:cSld>
+    <p:bg>
+      <p:bgPr>
+        <a:solidFill>
+          <a:schemeClr val="bg2"/>
+        </a:solidFill>
+        <a:effectLst/>
+      </p:bgPr>
+    </p:bg>
+    <p:spTree>
+      <p:nvGrpSpPr>
+        <p:cNvPr id="1" name=""/>
+        <p:cNvGrpSpPr/>
+        <p:nvPr/>
+      </p:nvGrpSpPr>
+      <p:grpSpPr>
+        <a:xfrm>
+          <a:off x="0" y="0"/>
+          <a:ext cx="0" cy="0"/>
+          <a:chOff x="0" y="0"/>
+          <a:chExt cx="0" cy="0"/>
+        </a:xfrm>
+      </p:grpSpPr>
+      <p:sp>
+        <p:nvSpPr>
+          <p:cNvPr id="2" name="Título 1">
+            <a:extLst>
+              <a:ext uri="{FF2B5EF4-FFF2-40B4-BE49-F238E27FC236}">
+                <a16:creationId xmlns:a16="http://schemas.microsoft.com/office/drawing/2014/main" id="{40961B6B-9C46-4AF9-9FF6-8A1D5E587502}"/>
+              </a:ext>
+            </a:extLst>
+          </p:cNvPr>
+          <p:cNvSpPr>
+            <a:spLocks noGrp="1"/>
+          </p:cNvSpPr>
+          <p:nvPr>
+            <p:ph type="title"/>
+          </p:nvPr>
+        </p:nvSpPr>
+        <p:spPr/>
+        <p:txBody>
+          <a:bodyPr/>
+          <a:lstStyle/>
+          <a:p>
+            <a:r>
+              <a:rPr lang="pt-BR">
+                <a:cs typeface="Calibri Light"/>
+              </a:rPr>
+              <a:t>O produto</a:t>
+            </a:r>
+            <a:endParaRPr lang="pt-BR"/>
+          </a:p>
+        </p:txBody>
+      </p:sp>
+      <p:sp>
+        <p:nvSpPr>
+          <p:cNvPr id="3" name="Espaço Reservado para Conteúdo 2">
+            <a:extLst>
+              <a:ext uri="{FF2B5EF4-FFF2-40B4-BE49-F238E27FC236}">
+                <a16:creationId xmlns:a16="http://schemas.microsoft.com/office/drawing/2014/main" id="{4E2E9D2A-A3C8-4643-A4EF-452F4C59F93D}"/>
+              </a:ext>
+            </a:extLst>
+          </p:cNvPr>
+          <p:cNvSpPr>
+            <a:spLocks noGrp="1"/>
+          </p:cNvSpPr>
+          <p:nvPr>
+            <p:ph idx="1"/>
+          </p:nvPr>
+        </p:nvSpPr>
+        <p:spPr/>
+        <p:txBody>
+          <a:bodyPr vert="horz" lIns="91440" tIns="45720" rIns="91440" bIns="45720" rtlCol="0" anchor="t">
+            <a:normAutofit/>
+          </a:bodyPr>
+          <a:lstStyle/>
+          <a:p>
+            <a:endParaRPr lang="pt-BR" dirty="0">
+              <a:cs typeface="Calibri"/>
+            </a:endParaRPr>
+          </a:p>
+          <a:p>
+            <a:r>
+              <a:rPr lang="pt-BR">
+                <a:cs typeface="Calibri"/>
+              </a:rPr>
+              <a:t>O OrganizZer é um gestor de tarefas que tem como objetivo proporcionar uma maior agilizade na organização nas tarefas pessoais e profissionais do dia a dia.</a:t>
+            </a:r>
+            <a:endParaRPr lang="pt-BR" dirty="0">
+              <a:cs typeface="Calibri"/>
+            </a:endParaRPr>
+          </a:p>
+        </p:txBody>
+      </p:sp>
+    </p:spTree>
+    <p:extLst>
+      <p:ext uri="{BB962C8B-B14F-4D97-AF65-F5344CB8AC3E}">
+        <p14:creationId xmlns:p14="http://schemas.microsoft.com/office/powerpoint/2010/main" val="4206089174"/>
+      </p:ext>
+    </p:extLst>
+  </p:cSld>
+  <p:clrMapOvr>
+    <a:masterClrMapping/>
+  </p:clrMapOvr>
+</p:sld>
+</file>
+
+<file path=ppt/slides/slide3.xml><?xml version="1.0" encoding="utf-8"?>
+<p:sld xmlns:a="http://schemas.openxmlformats.org/drawingml/2006/main" xmlns:r="http://schemas.openxmlformats.org/officeDocument/2006/relationships" xmlns:p="http://schemas.openxmlformats.org/presentationml/2006/main">
+  <p:cSld>
+    <p:bg>
+      <p:bgPr>
+        <a:solidFill>
+          <a:schemeClr val="bg2"/>
+        </a:solidFill>
+        <a:effectLst/>
+      </p:bgPr>
+    </p:bg>
+    <p:spTree>
+      <p:nvGrpSpPr>
+        <p:cNvPr id="1" name=""/>
+        <p:cNvGrpSpPr/>
+        <p:nvPr/>
+      </p:nvGrpSpPr>
+      <p:grpSpPr>
+        <a:xfrm>
+          <a:off x="0" y="0"/>
+          <a:ext cx="0" cy="0"/>
+          <a:chOff x="0" y="0"/>
+          <a:chExt cx="0" cy="0"/>
+        </a:xfrm>
+      </p:grpSpPr>
+      <p:sp>
+        <p:nvSpPr>
+          <p:cNvPr id="2" name="Título 1">
+            <a:extLst>
+              <a:ext uri="{FF2B5EF4-FFF2-40B4-BE49-F238E27FC236}">
+                <a16:creationId xmlns:a16="http://schemas.microsoft.com/office/drawing/2014/main" id="{AF84FF81-38E5-4CCA-B178-FBC988FE0424}"/>
+              </a:ext>
+            </a:extLst>
+          </p:cNvPr>
+          <p:cNvSpPr>
+            <a:spLocks noGrp="1"/>
+          </p:cNvSpPr>
+          <p:nvPr>
+            <p:ph type="title"/>
+          </p:nvPr>
+        </p:nvSpPr>
+        <p:spPr/>
+        <p:txBody>
+          <a:bodyPr/>
+          <a:lstStyle/>
+          <a:p>
+            <a:r>
+              <a:rPr lang="pt-BR">
+                <a:cs typeface="Calibri Light"/>
+              </a:rPr>
+              <a:t>Limites do produto</a:t>
+            </a:r>
+            <a:endParaRPr lang="pt-BR"/>
+          </a:p>
+        </p:txBody>
+      </p:sp>
+      <p:sp>
+        <p:nvSpPr>
+          <p:cNvPr id="3" name="Espaço Reservado para Conteúdo 2">
+            <a:extLst>
+              <a:ext uri="{FF2B5EF4-FFF2-40B4-BE49-F238E27FC236}">
+                <a16:creationId xmlns:a16="http://schemas.microsoft.com/office/drawing/2014/main" id="{DCFBC866-ACB9-4C08-AE88-B3D2F28C065B}"/>
+              </a:ext>
+            </a:extLst>
+          </p:cNvPr>
+          <p:cNvSpPr>
+            <a:spLocks noGrp="1"/>
+          </p:cNvSpPr>
+          <p:nvPr>
+            <p:ph idx="1"/>
+          </p:nvPr>
+        </p:nvSpPr>
+        <p:spPr/>
+        <p:txBody>
+          <a:bodyPr vert="horz" lIns="91440" tIns="45720" rIns="91440" bIns="45720" rtlCol="0" anchor="t">
+            <a:normAutofit/>
+          </a:bodyPr>
+          <a:lstStyle/>
+          <a:p>
+            <a:endParaRPr lang="pt-BR" dirty="0">
+              <a:cs typeface="Calibri"/>
+            </a:endParaRPr>
+          </a:p>
+          <a:p>
+            <a:r>
+              <a:rPr lang="pt-BR">
+                <a:cs typeface="Calibri"/>
+              </a:rPr>
+              <a:t>O OrganizZer não fornecerá o salvamento das informações em nuvem.</a:t>
+            </a:r>
+            <a:endParaRPr lang="pt-BR"/>
+          </a:p>
+          <a:p>
+            <a:endParaRPr lang="pt-BR" dirty="0">
+              <a:cs typeface="Calibri"/>
+            </a:endParaRPr>
+          </a:p>
+          <a:p>
+            <a:r>
+              <a:rPr lang="pt-BR">
+                <a:cs typeface="Calibri"/>
+              </a:rPr>
+              <a:t>O OrganizZer não exibirá notificações sobre as tarefas.</a:t>
+            </a:r>
+            <a:endParaRPr lang="pt-BR" dirty="0">
+              <a:cs typeface="Calibri"/>
+            </a:endParaRPr>
+          </a:p>
+        </p:txBody>
+      </p:sp>
+    </p:spTree>
+    <p:extLst>
+      <p:ext uri="{BB962C8B-B14F-4D97-AF65-F5344CB8AC3E}">
+        <p14:creationId xmlns:p14="http://schemas.microsoft.com/office/powerpoint/2010/main" val="3988287901"/>
+      </p:ext>
+    </p:extLst>
+  </p:cSld>
+  <p:clrMapOvr>
+    <a:masterClrMapping/>
+  </p:clrMapOvr>
+</p:sld>
+</file>
+
+<file path=ppt/slides/slide4.xml><?xml version="1.0" encoding="utf-8"?>
+<p:sld xmlns:a="http://schemas.openxmlformats.org/drawingml/2006/main" xmlns:r="http://schemas.openxmlformats.org/officeDocument/2006/relationships" xmlns:p="http://schemas.openxmlformats.org/presentationml/2006/main">
+  <p:cSld>
+    <p:bg>
+      <p:bgPr>
+        <a:solidFill>
+          <a:schemeClr val="bg2"/>
+        </a:solidFill>
+        <a:effectLst/>
+      </p:bgPr>
+    </p:bg>
+    <p:spTree>
+      <p:nvGrpSpPr>
+        <p:cNvPr id="1" name=""/>
+        <p:cNvGrpSpPr/>
+        <p:nvPr/>
+      </p:nvGrpSpPr>
+      <p:grpSpPr>
+        <a:xfrm>
+          <a:off x="0" y="0"/>
+          <a:ext cx="0" cy="0"/>
+          <a:chOff x="0" y="0"/>
+          <a:chExt cx="0" cy="0"/>
+        </a:xfrm>
+      </p:grpSpPr>
+      <p:sp>
+        <p:nvSpPr>
+          <p:cNvPr id="2" name="Título 1">
+            <a:extLst>
+              <a:ext uri="{FF2B5EF4-FFF2-40B4-BE49-F238E27FC236}">
+                <a16:creationId xmlns:a16="http://schemas.microsoft.com/office/drawing/2014/main" id="{C9F45582-5342-4747-BACF-1DBE4856C6E1}"/>
+              </a:ext>
+            </a:extLst>
+          </p:cNvPr>
+          <p:cNvSpPr>
+            <a:spLocks noGrp="1"/>
+          </p:cNvSpPr>
+          <p:nvPr>
+            <p:ph type="title"/>
+          </p:nvPr>
+        </p:nvSpPr>
+        <p:spPr/>
+        <p:txBody>
+          <a:bodyPr/>
+          <a:lstStyle/>
+          <a:p>
+            <a:r>
+              <a:rPr lang="pt-BR">
+                <a:cs typeface="Calibri Light"/>
+              </a:rPr>
+              <a:t>Benefícios do produto</a:t>
+            </a:r>
+            <a:endParaRPr lang="pt-BR"/>
+          </a:p>
+        </p:txBody>
+      </p:sp>
+      <p:sp>
+        <p:nvSpPr>
+          <p:cNvPr id="3" name="Espaço Reservado para Conteúdo 2">
+            <a:extLst>
+              <a:ext uri="{FF2B5EF4-FFF2-40B4-BE49-F238E27FC236}">
+                <a16:creationId xmlns:a16="http://schemas.microsoft.com/office/drawing/2014/main" id="{82628A45-CABF-442A-BA0C-897F2C82AF60}"/>
+              </a:ext>
+            </a:extLst>
+          </p:cNvPr>
+          <p:cNvSpPr>
+            <a:spLocks noGrp="1"/>
+          </p:cNvSpPr>
+          <p:nvPr>
+            <p:ph idx="1"/>
+          </p:nvPr>
+        </p:nvSpPr>
+        <p:spPr/>
+        <p:txBody>
+          <a:bodyPr vert="horz" lIns="91440" tIns="45720" rIns="91440" bIns="45720" rtlCol="0" anchor="t">
+            <a:normAutofit/>
+          </a:bodyPr>
+          <a:lstStyle/>
+          <a:p>
+            <a:endParaRPr lang="pt-BR" dirty="0">
+              <a:cs typeface="Calibri"/>
+            </a:endParaRPr>
+          </a:p>
+          <a:p>
+            <a:r>
+              <a:rPr lang="pt-BR">
+                <a:cs typeface="Calibri"/>
+              </a:rPr>
+              <a:t>Agilidade na organização de tarefas.</a:t>
+            </a:r>
+            <a:endParaRPr lang="pt-BR"/>
+          </a:p>
+          <a:p>
+            <a:endParaRPr lang="pt-BR" dirty="0">
+              <a:cs typeface="Calibri"/>
+            </a:endParaRPr>
+          </a:p>
+          <a:p>
+            <a:r>
+              <a:rPr lang="pt-BR">
+                <a:cs typeface="Calibri"/>
+              </a:rPr>
+              <a:t>Visualizaão do progresso das tarefas</a:t>
+            </a:r>
+            <a:endParaRPr lang="pt-BR" dirty="0">
+              <a:cs typeface="Calibri"/>
+            </a:endParaRPr>
+          </a:p>
+        </p:txBody>
+      </p:sp>
+    </p:spTree>
+    <p:extLst>
+      <p:ext uri="{BB962C8B-B14F-4D97-AF65-F5344CB8AC3E}">
+        <p14:creationId xmlns:p14="http://schemas.microsoft.com/office/powerpoint/2010/main" val="2686564698"/>
+      </p:ext>
+    </p:extLst>
+  </p:cSld>
+  <p:clrMapOvr>
+    <a:masterClrMapping/>
+  </p:clrMapOvr>
+</p:sld>
+</file>
+
+<file path=ppt/slides/slide5.xml><?xml version="1.0" encoding="utf-8"?>
+<p:sld xmlns:a="http://schemas.openxmlformats.org/drawingml/2006/main" xmlns:r="http://schemas.openxmlformats.org/officeDocument/2006/relationships" xmlns:p="http://schemas.openxmlformats.org/presentationml/2006/main">
+  <p:cSld>
+    <p:bg>
+      <p:bgPr>
+        <a:solidFill>
+          <a:schemeClr val="bg2"/>
+        </a:solidFill>
+        <a:effectLst/>
+      </p:bgPr>
+    </p:bg>
     <p:spTree>
       <p:nvGrpSpPr>
         <p:cNvPr id="1" name=""/>
@@ -3140,9 +3806,17 @@
 </p:sld>
 </file>
 
-<file path=ppt/slides/slide3.xml><?xml version="1.0" encoding="utf-8"?>
+<file path=ppt/slides/slide6.xml><?xml version="1.0" encoding="utf-8"?>
 <p:sld xmlns:a="http://schemas.openxmlformats.org/drawingml/2006/main" xmlns:r="http://schemas.openxmlformats.org/officeDocument/2006/relationships" xmlns:p="http://schemas.openxmlformats.org/presentationml/2006/main">
   <p:cSld>
+    <p:bg>
+      <p:bgPr>
+        <a:solidFill>
+          <a:schemeClr val="bg2"/>
+        </a:solidFill>
+        <a:effectLst/>
+      </p:bgPr>
+    </p:bg>
     <p:spTree>
       <p:nvGrpSpPr>
         <p:cNvPr id="1" name=""/>
@@ -3233,9 +3907,17 @@
 </p:sld>
 </file>
 
-<file path=ppt/slides/slide4.xml><?xml version="1.0" encoding="utf-8"?>
+<file path=ppt/slides/slide7.xml><?xml version="1.0" encoding="utf-8"?>
 <p:sld xmlns:a="http://schemas.openxmlformats.org/drawingml/2006/main" xmlns:r="http://schemas.openxmlformats.org/officeDocument/2006/relationships" xmlns:p="http://schemas.openxmlformats.org/presentationml/2006/main">
   <p:cSld>
+    <p:bg>
+      <p:bgPr>
+        <a:solidFill>
+          <a:schemeClr val="bg2"/>
+        </a:solidFill>
+        <a:effectLst/>
+      </p:bgPr>
+    </p:bg>
     <p:spTree>
       <p:nvGrpSpPr>
         <p:cNvPr id="1" name=""/>
@@ -3283,7 +3965,7 @@
       </p:sp>
       <p:pic>
         <p:nvPicPr>
-          <p:cNvPr id="4" name="Imagem 4" descr="Uma imagem contendo captura de tela, texto&#10;&#10;Descrição gerada com alta confiança">
+          <p:cNvPr id="4" name="Imagem 4" descr="Uma imagem contendo captura de tela&#10;&#10;Descrição gerada com muito alta confiança">
             <a:extLst>
               <a:ext uri="{FF2B5EF4-FFF2-40B4-BE49-F238E27FC236}">
                 <a16:creationId xmlns:a16="http://schemas.microsoft.com/office/drawing/2014/main" id="{B8BC0ECC-DCD4-4391-BFF9-563F3E73F353}"/>
@@ -3305,8 +3987,8 @@
         </p:blipFill>
         <p:spPr>
           <a:xfrm>
-            <a:off x="1381199" y="1162403"/>
-            <a:ext cx="8399490" cy="6510338"/>
+            <a:off x="1383765" y="1162403"/>
+            <a:ext cx="8394358" cy="6510338"/>
           </a:xfrm>
           <a:prstGeom prst="rect">
             <a:avLst/>
@@ -3326,9 +4008,17 @@
 </p:sld>
 </file>
 
-<file path=ppt/slides/slide5.xml><?xml version="1.0" encoding="utf-8"?>
+<file path=ppt/slides/slide8.xml><?xml version="1.0" encoding="utf-8"?>
 <p:sld xmlns:a="http://schemas.openxmlformats.org/drawingml/2006/main" xmlns:r="http://schemas.openxmlformats.org/officeDocument/2006/relationships" xmlns:p="http://schemas.openxmlformats.org/presentationml/2006/main">
   <p:cSld>
+    <p:bg>
+      <p:bgPr>
+        <a:solidFill>
+          <a:schemeClr val="bg2"/>
+        </a:solidFill>
+        <a:effectLst/>
+      </p:bgPr>
+    </p:bg>
     <p:spTree>
       <p:nvGrpSpPr>
         <p:cNvPr id="1" name=""/>
@@ -3419,9 +4109,17 @@
 </p:sld>
 </file>
 
-<file path=ppt/slides/slide6.xml><?xml version="1.0" encoding="utf-8"?>
+<file path=ppt/slides/slide9.xml><?xml version="1.0" encoding="utf-8"?>
 <p:sld xmlns:a="http://schemas.openxmlformats.org/drawingml/2006/main" xmlns:r="http://schemas.openxmlformats.org/officeDocument/2006/relationships" xmlns:p="http://schemas.openxmlformats.org/presentationml/2006/main">
   <p:cSld>
+    <p:bg>
+      <p:bgPr>
+        <a:solidFill>
+          <a:schemeClr val="bg2"/>
+        </a:solidFill>
+        <a:effectLst/>
+      </p:bgPr>
+    </p:bg>
     <p:spTree>
       <p:nvGrpSpPr>
         <p:cNvPr id="1" name=""/>
@@ -3503,191 +4201,6 @@
     <p:extLst>
       <p:ext uri="{BB962C8B-B14F-4D97-AF65-F5344CB8AC3E}">
         <p14:creationId xmlns:p14="http://schemas.microsoft.com/office/powerpoint/2010/main" val="3407987123"/>
-      </p:ext>
-    </p:extLst>
-  </p:cSld>
-  <p:clrMapOvr>
-    <a:masterClrMapping/>
-  </p:clrMapOvr>
-</p:sld>
-</file>
-
-<file path=ppt/slides/slide7.xml><?xml version="1.0" encoding="utf-8"?>
-<p:sld xmlns:a="http://schemas.openxmlformats.org/drawingml/2006/main" xmlns:r="http://schemas.openxmlformats.org/officeDocument/2006/relationships" xmlns:p="http://schemas.openxmlformats.org/presentationml/2006/main">
-  <p:cSld>
-    <p:spTree>
-      <p:nvGrpSpPr>
-        <p:cNvPr id="1" name=""/>
-        <p:cNvGrpSpPr/>
-        <p:nvPr/>
-      </p:nvGrpSpPr>
-      <p:grpSpPr>
-        <a:xfrm>
-          <a:off x="0" y="0"/>
-          <a:ext cx="0" cy="0"/>
-          <a:chOff x="0" y="0"/>
-          <a:chExt cx="0" cy="0"/>
-        </a:xfrm>
-      </p:grpSpPr>
-      <p:sp>
-        <p:nvSpPr>
-          <p:cNvPr id="2" name="Título 1">
-            <a:extLst>
-              <a:ext uri="{FF2B5EF4-FFF2-40B4-BE49-F238E27FC236}">
-                <a16:creationId xmlns:a16="http://schemas.microsoft.com/office/drawing/2014/main" id="{B1832E8B-AADD-4CF8-AEEE-5E79DEEA600E}"/>
-              </a:ext>
-            </a:extLst>
-          </p:cNvPr>
-          <p:cNvSpPr>
-            <a:spLocks noGrp="1"/>
-          </p:cNvSpPr>
-          <p:nvPr>
-            <p:ph type="title"/>
-          </p:nvPr>
-        </p:nvSpPr>
-        <p:spPr/>
-        <p:txBody>
-          <a:bodyPr/>
-          <a:lstStyle/>
-          <a:p>
-            <a:r>
-              <a:rPr lang="pt-BR" dirty="0">
-                <a:cs typeface="Calibri Light"/>
-              </a:rPr>
-              <a:t>Tela de Tarefa</a:t>
-            </a:r>
-            <a:endParaRPr lang="pt-BR" dirty="0"/>
-          </a:p>
-        </p:txBody>
-      </p:sp>
-      <p:pic>
-        <p:nvPicPr>
-          <p:cNvPr id="4" name="Imagem 4" descr="Uma imagem contendo captura de tela&#10;&#10;Descrição gerada com muito alta confiança">
-            <a:extLst>
-              <a:ext uri="{FF2B5EF4-FFF2-40B4-BE49-F238E27FC236}">
-                <a16:creationId xmlns:a16="http://schemas.microsoft.com/office/drawing/2014/main" id="{B38A0FC7-794A-4424-8CC4-DEBEB0C95C24}"/>
-              </a:ext>
-            </a:extLst>
-          </p:cNvPr>
-          <p:cNvPicPr>
-            <a:picLocks noGrp="1" noChangeAspect="1"/>
-          </p:cNvPicPr>
-          <p:nvPr>
-            <p:ph idx="1"/>
-          </p:nvPr>
-        </p:nvPicPr>
-        <p:blipFill>
-          <a:blip r:embed="rId2"/>
-          <a:stretch>
-            <a:fillRect/>
-          </a:stretch>
-        </p:blipFill>
-        <p:spPr>
-          <a:xfrm>
-            <a:off x="4879741" y="1825625"/>
-            <a:ext cx="2432519" cy="4351338"/>
-          </a:xfrm>
-          <a:prstGeom prst="rect">
-            <a:avLst/>
-          </a:prstGeom>
-        </p:spPr>
-      </p:pic>
-    </p:spTree>
-    <p:extLst>
-      <p:ext uri="{BB962C8B-B14F-4D97-AF65-F5344CB8AC3E}">
-        <p14:creationId xmlns:p14="http://schemas.microsoft.com/office/powerpoint/2010/main" val="223440725"/>
-      </p:ext>
-    </p:extLst>
-  </p:cSld>
-  <p:clrMapOvr>
-    <a:masterClrMapping/>
-  </p:clrMapOvr>
-</p:sld>
-</file>
-
-<file path=ppt/slides/slide8.xml><?xml version="1.0" encoding="utf-8"?>
-<p:sld xmlns:a="http://schemas.openxmlformats.org/drawingml/2006/main" xmlns:r="http://schemas.openxmlformats.org/officeDocument/2006/relationships" xmlns:p="http://schemas.openxmlformats.org/presentationml/2006/main">
-  <p:cSld>
-    <p:spTree>
-      <p:nvGrpSpPr>
-        <p:cNvPr id="1" name=""/>
-        <p:cNvGrpSpPr/>
-        <p:nvPr/>
-      </p:nvGrpSpPr>
-      <p:grpSpPr>
-        <a:xfrm>
-          <a:off x="0" y="0"/>
-          <a:ext cx="0" cy="0"/>
-          <a:chOff x="0" y="0"/>
-          <a:chExt cx="0" cy="0"/>
-        </a:xfrm>
-      </p:grpSpPr>
-      <p:sp>
-        <p:nvSpPr>
-          <p:cNvPr id="2" name="Título 1">
-            <a:extLst>
-              <a:ext uri="{FF2B5EF4-FFF2-40B4-BE49-F238E27FC236}">
-                <a16:creationId xmlns:a16="http://schemas.microsoft.com/office/drawing/2014/main" id="{FC4BE301-2206-43AF-8358-86206A597EFD}"/>
-              </a:ext>
-            </a:extLst>
-          </p:cNvPr>
-          <p:cNvSpPr>
-            <a:spLocks noGrp="1"/>
-          </p:cNvSpPr>
-          <p:nvPr>
-            <p:ph type="title"/>
-          </p:nvPr>
-        </p:nvSpPr>
-        <p:spPr/>
-        <p:txBody>
-          <a:bodyPr/>
-          <a:lstStyle/>
-          <a:p>
-            <a:r>
-              <a:rPr lang="pt-BR" dirty="0">
-                <a:cs typeface="Calibri Light"/>
-              </a:rPr>
-              <a:t>Tela de cadastro de nova tarefa</a:t>
-            </a:r>
-          </a:p>
-        </p:txBody>
-      </p:sp>
-      <p:pic>
-        <p:nvPicPr>
-          <p:cNvPr id="4" name="Imagem 4" descr="Uma imagem contendo captura de tela&#10;&#10;Descrição gerada com muito alta confiança">
-            <a:extLst>
-              <a:ext uri="{FF2B5EF4-FFF2-40B4-BE49-F238E27FC236}">
-                <a16:creationId xmlns:a16="http://schemas.microsoft.com/office/drawing/2014/main" id="{91B77452-B5E6-45FD-AFF4-7198F7340D5A}"/>
-              </a:ext>
-            </a:extLst>
-          </p:cNvPr>
-          <p:cNvPicPr>
-            <a:picLocks noGrp="1" noChangeAspect="1"/>
-          </p:cNvPicPr>
-          <p:nvPr>
-            <p:ph idx="1"/>
-          </p:nvPr>
-        </p:nvPicPr>
-        <p:blipFill>
-          <a:blip r:embed="rId2"/>
-          <a:stretch>
-            <a:fillRect/>
-          </a:stretch>
-        </p:blipFill>
-        <p:spPr>
-          <a:xfrm>
-            <a:off x="4875503" y="1825625"/>
-            <a:ext cx="2440994" cy="4351338"/>
-          </a:xfrm>
-          <a:prstGeom prst="rect">
-            <a:avLst/>
-          </a:prstGeom>
-        </p:spPr>
-      </p:pic>
-    </p:spTree>
-    <p:extLst>
-      <p:ext uri="{BB962C8B-B14F-4D97-AF65-F5344CB8AC3E}">
-        <p14:creationId xmlns:p14="http://schemas.microsoft.com/office/powerpoint/2010/main" val="3230421827"/>
       </p:ext>
     </p:extLst>
   </p:cSld>

</xml_diff>